<commit_message>
Rmd files globally finished.  ppt still needs some work
</commit_message>
<xml_diff>
--- a/GitConda.pptx
+++ b/GitConda.pptx
@@ -10,12 +10,9 @@
     <p:sldId id="258" r:id="rId4"/>
     <p:sldId id="257" r:id="rId5"/>
     <p:sldId id="268" r:id="rId6"/>
-    <p:sldId id="259" r:id="rId7"/>
-    <p:sldId id="263" r:id="rId8"/>
-    <p:sldId id="264" r:id="rId9"/>
-    <p:sldId id="265" r:id="rId10"/>
-    <p:sldId id="266" r:id="rId11"/>
-    <p:sldId id="267" r:id="rId12"/>
+    <p:sldId id="270" r:id="rId7"/>
+    <p:sldId id="269" r:id="rId8"/>
+    <p:sldId id="259" r:id="rId9"/>
   </p:sldIdLst>
   <p:sldSz cx="12192000" cy="6858000"/>
   <p:notesSz cx="6858000" cy="9144000"/>
@@ -5371,30 +5368,19 @@
             <p:ph type="ctrTitle"/>
           </p:nvPr>
         </p:nvSpPr>
-        <p:spPr/>
+        <p:spPr>
+          <a:xfrm>
+            <a:off x="182880" y="1449147"/>
+            <a:ext cx="11874137" cy="2971051"/>
+          </a:xfrm>
+        </p:spPr>
         <p:txBody>
           <a:bodyPr/>
           <a:lstStyle/>
           <a:p>
             <a:r>
               <a:rPr lang="nl-NL" dirty="0"/>
-              <a:t>BBDA: </a:t>
-            </a:r>
-            <a:r>
-              <a:rPr lang="nl-NL" dirty="0" err="1"/>
-              <a:t>tooling</a:t>
-            </a:r>
-            <a:r>
-              <a:rPr lang="nl-NL" dirty="0"/>
-              <a:t> </a:t>
-            </a:r>
-            <a:r>
-              <a:rPr lang="nl-NL" dirty="0" err="1"/>
-              <a:t>and</a:t>
-            </a:r>
-            <a:r>
-              <a:rPr lang="nl-NL" dirty="0"/>
-              <a:t> setup</a:t>
+              <a:t>BBDA: tool &amp; data management</a:t>
             </a:r>
             <a:endParaRPr lang="en-GB" dirty="0"/>
           </a:p>
@@ -5433,319 +5419,6 @@
     <p:extLst>
       <p:ext uri="{BB962C8B-B14F-4D97-AF65-F5344CB8AC3E}">
         <p14:creationId xmlns:p14="http://schemas.microsoft.com/office/powerpoint/2010/main" val="3396683550"/>
-      </p:ext>
-    </p:extLst>
-  </p:cSld>
-  <p:clrMapOvr>
-    <a:masterClrMapping/>
-  </p:clrMapOvr>
-</p:sld>
-</file>
-
-<file path=ppt/slides/slide10.xml><?xml version="1.0" encoding="utf-8"?>
-<p:sld xmlns:a="http://schemas.openxmlformats.org/drawingml/2006/main" xmlns:r="http://schemas.openxmlformats.org/officeDocument/2006/relationships" xmlns:p="http://schemas.openxmlformats.org/presentationml/2006/main">
-  <p:cSld>
-    <p:spTree>
-      <p:nvGrpSpPr>
-        <p:cNvPr id="1" name=""/>
-        <p:cNvGrpSpPr/>
-        <p:nvPr/>
-      </p:nvGrpSpPr>
-      <p:grpSpPr>
-        <a:xfrm>
-          <a:off x="0" y="0"/>
-          <a:ext cx="0" cy="0"/>
-          <a:chOff x="0" y="0"/>
-          <a:chExt cx="0" cy="0"/>
-        </a:xfrm>
-      </p:grpSpPr>
-      <p:sp>
-        <p:nvSpPr>
-          <p:cNvPr id="2" name="Titel 1">
-            <a:extLst>
-              <a:ext uri="{FF2B5EF4-FFF2-40B4-BE49-F238E27FC236}">
-                <a16:creationId xmlns:a16="http://schemas.microsoft.com/office/drawing/2014/main" id="{A5A16DD0-E72C-489B-BD6E-F755D7DF5528}"/>
-              </a:ext>
-            </a:extLst>
-          </p:cNvPr>
-          <p:cNvSpPr>
-            <a:spLocks noGrp="1"/>
-          </p:cNvSpPr>
-          <p:nvPr>
-            <p:ph type="title"/>
-          </p:nvPr>
-        </p:nvSpPr>
-        <p:spPr/>
-        <p:txBody>
-          <a:bodyPr/>
-          <a:lstStyle/>
-          <a:p>
-            <a:r>
-              <a:rPr lang="en-US" dirty="0"/>
-              <a:t>Assignment</a:t>
-            </a:r>
-          </a:p>
-        </p:txBody>
-      </p:sp>
-      <p:sp>
-        <p:nvSpPr>
-          <p:cNvPr id="3" name="Tijdelijke aanduiding voor inhoud 2">
-            <a:extLst>
-              <a:ext uri="{FF2B5EF4-FFF2-40B4-BE49-F238E27FC236}">
-                <a16:creationId xmlns:a16="http://schemas.microsoft.com/office/drawing/2014/main" id="{D10CB68B-D3B3-4B6C-8978-CD31A6C764BE}"/>
-              </a:ext>
-            </a:extLst>
-          </p:cNvPr>
-          <p:cNvSpPr>
-            <a:spLocks noGrp="1"/>
-          </p:cNvSpPr>
-          <p:nvPr>
-            <p:ph idx="1"/>
-          </p:nvPr>
-        </p:nvSpPr>
-        <p:spPr/>
-        <p:txBody>
-          <a:bodyPr/>
-          <a:lstStyle/>
-          <a:p>
-            <a:r>
-              <a:rPr lang="en-US" dirty="0"/>
-              <a:t>https://sils-pub.science.uva.nl/mad/education/BBDA/bioinformatics/Slurm2021.html</a:t>
-            </a:r>
-          </a:p>
-          <a:p>
-            <a:endParaRPr lang="en-US" dirty="0"/>
-          </a:p>
-        </p:txBody>
-      </p:sp>
-    </p:spTree>
-    <p:extLst>
-      <p:ext uri="{BB962C8B-B14F-4D97-AF65-F5344CB8AC3E}">
-        <p14:creationId xmlns:p14="http://schemas.microsoft.com/office/powerpoint/2010/main" val="1590318590"/>
-      </p:ext>
-    </p:extLst>
-  </p:cSld>
-  <p:clrMapOvr>
-    <a:masterClrMapping/>
-  </p:clrMapOvr>
-</p:sld>
-</file>
-
-<file path=ppt/slides/slide11.xml><?xml version="1.0" encoding="utf-8"?>
-<p:sld xmlns:a="http://schemas.openxmlformats.org/drawingml/2006/main" xmlns:r="http://schemas.openxmlformats.org/officeDocument/2006/relationships" xmlns:p="http://schemas.openxmlformats.org/presentationml/2006/main">
-  <p:cSld>
-    <p:spTree>
-      <p:nvGrpSpPr>
-        <p:cNvPr id="1" name=""/>
-        <p:cNvGrpSpPr/>
-        <p:nvPr/>
-      </p:nvGrpSpPr>
-      <p:grpSpPr>
-        <a:xfrm>
-          <a:off x="0" y="0"/>
-          <a:ext cx="0" cy="0"/>
-          <a:chOff x="0" y="0"/>
-          <a:chExt cx="0" cy="0"/>
-        </a:xfrm>
-      </p:grpSpPr>
-      <p:sp>
-        <p:nvSpPr>
-          <p:cNvPr id="2" name="Titel 1">
-            <a:extLst>
-              <a:ext uri="{FF2B5EF4-FFF2-40B4-BE49-F238E27FC236}">
-                <a16:creationId xmlns:a16="http://schemas.microsoft.com/office/drawing/2014/main" id="{E835A106-05D4-4D66-8AC9-E351DFD45F9C}"/>
-              </a:ext>
-            </a:extLst>
-          </p:cNvPr>
-          <p:cNvSpPr>
-            <a:spLocks noGrp="1"/>
-          </p:cNvSpPr>
-          <p:nvPr>
-            <p:ph type="title"/>
-          </p:nvPr>
-        </p:nvSpPr>
-        <p:spPr/>
-        <p:txBody>
-          <a:bodyPr/>
-          <a:lstStyle/>
-          <a:p>
-            <a:r>
-              <a:rPr lang="en-US" dirty="0"/>
-              <a:t>Most common mistakes</a:t>
-            </a:r>
-          </a:p>
-        </p:txBody>
-      </p:sp>
-      <p:sp>
-        <p:nvSpPr>
-          <p:cNvPr id="3" name="Tijdelijke aanduiding voor inhoud 2">
-            <a:extLst>
-              <a:ext uri="{FF2B5EF4-FFF2-40B4-BE49-F238E27FC236}">
-                <a16:creationId xmlns:a16="http://schemas.microsoft.com/office/drawing/2014/main" id="{EA1EEEDD-15F9-4D06-9ABF-7C520CA2D2B3}"/>
-              </a:ext>
-            </a:extLst>
-          </p:cNvPr>
-          <p:cNvSpPr>
-            <a:spLocks noGrp="1"/>
-          </p:cNvSpPr>
-          <p:nvPr>
-            <p:ph idx="1"/>
-          </p:nvPr>
-        </p:nvSpPr>
-        <p:spPr>
-          <a:xfrm>
-            <a:off x="818712" y="2222287"/>
-            <a:ext cx="11042362" cy="4188525"/>
-          </a:xfrm>
-        </p:spPr>
-        <p:txBody>
-          <a:bodyPr>
-            <a:normAutofit lnSpcReduction="10000"/>
-          </a:bodyPr>
-          <a:lstStyle/>
-          <a:p>
-            <a:r>
-              <a:rPr lang="en-US" dirty="0"/>
-              <a:t>No memory allocation</a:t>
-            </a:r>
-          </a:p>
-          <a:p>
-            <a:pPr lvl="1"/>
-            <a:r>
-              <a:rPr lang="en-US" dirty="0"/>
-              <a:t>Default allocation 100MB</a:t>
-            </a:r>
-          </a:p>
-          <a:p>
-            <a:pPr lvl="1"/>
-            <a:r>
-              <a:rPr lang="en-US" dirty="0"/>
-              <a:t>Some programs simply stop with error other continue </a:t>
-            </a:r>
-            <a:r>
-              <a:rPr lang="en-US" dirty="0" err="1"/>
-              <a:t>verrrrry</a:t>
-            </a:r>
-            <a:r>
-              <a:rPr lang="en-US" dirty="0"/>
-              <a:t> slowly using disk as  </a:t>
-            </a:r>
-            <a:r>
-              <a:rPr lang="en-US" dirty="0" err="1"/>
-              <a:t>mermory</a:t>
-            </a:r>
-            <a:r>
-              <a:rPr lang="en-US" dirty="0"/>
-              <a:t>.</a:t>
-            </a:r>
-          </a:p>
-          <a:p>
-            <a:pPr lvl="1"/>
-            <a:r>
-              <a:rPr lang="en-US" dirty="0"/>
-              <a:t>Use –mem or –mem-per-</a:t>
-            </a:r>
-            <a:r>
-              <a:rPr lang="en-US" dirty="0" err="1"/>
-              <a:t>cpu</a:t>
-            </a:r>
-            <a:r>
-              <a:rPr lang="en-US" dirty="0"/>
-              <a:t>  to specify memory</a:t>
-            </a:r>
-          </a:p>
-          <a:p>
-            <a:r>
-              <a:rPr lang="en-US" dirty="0"/>
-              <a:t>Over allocation of </a:t>
-            </a:r>
-            <a:r>
-              <a:rPr lang="en-US" dirty="0" err="1"/>
-              <a:t>cpu</a:t>
-            </a:r>
-            <a:endParaRPr lang="en-US" dirty="0"/>
-          </a:p>
-          <a:p>
-            <a:pPr lvl="1"/>
-            <a:r>
-              <a:rPr lang="en-US" dirty="0"/>
-              <a:t>Use top or </a:t>
-            </a:r>
-            <a:r>
-              <a:rPr lang="en-US" dirty="0" err="1"/>
-              <a:t>htop</a:t>
-            </a:r>
-            <a:r>
-              <a:rPr lang="en-US" dirty="0"/>
-              <a:t> on node to check if allocation is filled</a:t>
-            </a:r>
-          </a:p>
-          <a:p>
-            <a:r>
-              <a:rPr lang="en-US" dirty="0" err="1"/>
-              <a:t>Forgetten</a:t>
-            </a:r>
-            <a:r>
-              <a:rPr lang="en-US" dirty="0"/>
-              <a:t> interactive allocations </a:t>
-            </a:r>
-          </a:p>
-          <a:p>
-            <a:pPr lvl="1"/>
-            <a:r>
-              <a:rPr lang="en-US" dirty="0"/>
-              <a:t>Using a –time  with all your jobs </a:t>
-            </a:r>
-          </a:p>
-          <a:p>
-            <a:r>
-              <a:rPr lang="en-US" dirty="0"/>
-              <a:t>Filling up /</a:t>
-            </a:r>
-            <a:r>
-              <a:rPr lang="en-US" dirty="0" err="1"/>
-              <a:t>tmp</a:t>
-            </a:r>
-            <a:r>
-              <a:rPr lang="en-US" dirty="0"/>
-              <a:t> on compute node </a:t>
-            </a:r>
-          </a:p>
-          <a:p>
-            <a:pPr lvl="1"/>
-            <a:r>
-              <a:rPr lang="en-US" dirty="0"/>
-              <a:t>Use /scratch,  Set TMPDIR variable to /scratch  </a:t>
-            </a:r>
-          </a:p>
-          <a:p>
-            <a:r>
-              <a:rPr lang="en-US" dirty="0">
-                <a:solidFill>
-                  <a:srgbClr val="FFFF00"/>
-                </a:solidFill>
-              </a:rPr>
-              <a:t>Tip:</a:t>
-            </a:r>
-            <a:r>
-              <a:rPr lang="en-US" dirty="0"/>
-              <a:t>  While a job is running,  </a:t>
-            </a:r>
-            <a:r>
-              <a:rPr lang="en-US" dirty="0" err="1"/>
-              <a:t>ssh</a:t>
-            </a:r>
-            <a:r>
-              <a:rPr lang="en-US" dirty="0"/>
-              <a:t> to the node is possible, use (h)top –u  $USER to check processes </a:t>
-            </a:r>
-          </a:p>
-        </p:txBody>
-      </p:sp>
-    </p:spTree>
-    <p:extLst>
-      <p:ext uri="{BB962C8B-B14F-4D97-AF65-F5344CB8AC3E}">
-        <p14:creationId xmlns:p14="http://schemas.microsoft.com/office/powerpoint/2010/main" val="1148004568"/>
       </p:ext>
     </p:extLst>
   </p:cSld>
@@ -5823,13 +5496,8 @@
           <a:p>
             <a:r>
               <a:rPr lang="en-US" dirty="0"/>
-              <a:t>9:30  Lecture </a:t>
-            </a:r>
-            <a:r>
-              <a:rPr lang="en-US" dirty="0" err="1"/>
-              <a:t>ntroduction</a:t>
-            </a:r>
-            <a:endParaRPr lang="en-US" dirty="0"/>
+              <a:t>9:30  Lecture introduction</a:t>
+            </a:r>
           </a:p>
           <a:p>
             <a:r>
@@ -6018,7 +5686,7 @@
           <a:p>
             <a:r>
               <a:rPr lang="en-US" dirty="0"/>
-              <a:t>Data and project management</a:t>
+              <a:t>Data management</a:t>
             </a:r>
           </a:p>
         </p:txBody>
@@ -6051,25 +5719,63 @@
           </a:bodyPr>
           <a:lstStyle/>
           <a:p>
-            <a:endParaRPr lang="en-US" dirty="0"/>
-          </a:p>
-          <a:p>
             <a:r>
               <a:rPr lang="en-US" dirty="0"/>
-              <a:t>analysis process consists of steps  with lots of intermediate data</a:t>
-            </a:r>
-          </a:p>
-          <a:p>
+              <a:t>Analysis process consists of steps  with lots of intermediate data</a:t>
+            </a:r>
+          </a:p>
+          <a:p>
+            <a:pPr lvl="1"/>
             <a:r>
               <a:rPr lang="en-US" dirty="0"/>
-              <a:t>Plan and organize data during project</a:t>
+              <a:t>Hard to understand data without description</a:t>
             </a:r>
           </a:p>
           <a:p>
             <a:pPr lvl="1"/>
             <a:r>
               <a:rPr lang="en-US" dirty="0"/>
-              <a:t>Store raw data  and process description to get end results </a:t>
+              <a:t>Storage costs money</a:t>
+            </a:r>
+          </a:p>
+          <a:p>
+            <a:r>
+              <a:rPr lang="en-US" dirty="0"/>
+              <a:t>Plan and organize data during  the lifetime of a project</a:t>
+            </a:r>
+          </a:p>
+          <a:p>
+            <a:pPr lvl="1"/>
+            <a:r>
+              <a:rPr lang="en-US" dirty="0"/>
+              <a:t>Distinguish  temporary data from data which should be kept</a:t>
+            </a:r>
+          </a:p>
+          <a:p>
+            <a:pPr lvl="1"/>
+            <a:r>
+              <a:rPr lang="en-US" dirty="0"/>
+              <a:t>Ideally:  raw data and code with process description which can be run to get end results</a:t>
+            </a:r>
+          </a:p>
+          <a:p>
+            <a:pPr lvl="1"/>
+            <a:r>
+              <a:rPr lang="en-US" dirty="0"/>
+              <a:t>Add metadata: write comments and document  the content of all  data files</a:t>
+            </a:r>
+          </a:p>
+          <a:p>
+            <a:pPr lvl="1"/>
+            <a:r>
+              <a:rPr lang="en-US" dirty="0"/>
+              <a:t>Avoid manual tweaks of the data in the pipeline  </a:t>
+            </a:r>
+          </a:p>
+          <a:p>
+            <a:r>
+              <a:rPr lang="en-US" dirty="0"/>
+              <a:t>Clean at the end</a:t>
             </a:r>
           </a:p>
           <a:p>
@@ -6133,8 +5839,12 @@
           <a:lstStyle/>
           <a:p>
             <a:r>
+              <a:rPr lang="en-US" dirty="0"/>
+              <a:t>Software management: </a:t>
+            </a:r>
+            <a:r>
               <a:rPr lang="en-US" dirty="0" err="1"/>
-              <a:t>Conda</a:t>
+              <a:t>conda</a:t>
             </a:r>
             <a:endParaRPr lang="en-US" dirty="0"/>
           </a:p>
@@ -6163,28 +5873,42 @@
           <a:p>
             <a:r>
               <a:rPr lang="en-US" dirty="0"/>
-              <a:t>User control over installation of tools  </a:t>
+              <a:t>User controlled installation of tools: no admin privileges needed</a:t>
             </a:r>
           </a:p>
           <a:p>
             <a:pPr lvl="1"/>
             <a:r>
               <a:rPr lang="en-US" dirty="0"/>
-              <a:t>Programs </a:t>
+              <a:t>Large collection of tools and programs </a:t>
             </a:r>
           </a:p>
           <a:p>
             <a:pPr lvl="1"/>
             <a:r>
               <a:rPr lang="en-US" dirty="0"/>
-              <a:t>Control over versions of programs </a:t>
+              <a:t>Control over versions of programs  and libraries. </a:t>
             </a:r>
           </a:p>
           <a:p>
             <a:pPr lvl="1"/>
             <a:r>
               <a:rPr lang="en-US" dirty="0"/>
-              <a:t>Separate environments for different tools </a:t>
+              <a:t>Separate environments for different tools</a:t>
+            </a:r>
+          </a:p>
+          <a:p>
+            <a:pPr lvl="1"/>
+            <a:r>
+              <a:rPr lang="en-US" dirty="0"/>
+              <a:t>Environments can be complicated,  it usually works, debugging hard. </a:t>
+            </a:r>
+          </a:p>
+          <a:p>
+            <a:pPr lvl="1"/>
+            <a:r>
+              <a:rPr lang="en-US" dirty="0"/>
+              <a:t>storage space needed,  usually small compared to data</a:t>
             </a:r>
           </a:p>
         </p:txBody>
@@ -6224,7 +5948,7 @@
           <p:cNvPr id="2" name="Titel 1">
             <a:extLst>
               <a:ext uri="{FF2B5EF4-FFF2-40B4-BE49-F238E27FC236}">
-                <a16:creationId xmlns:a16="http://schemas.microsoft.com/office/drawing/2014/main" id="{9C7DB70D-9CE3-4D62-837F-2DB44020DDFA}"/>
+                <a16:creationId xmlns:a16="http://schemas.microsoft.com/office/drawing/2014/main" id="{23A848F1-BDD4-4CD7-947D-9286A281C19E}"/>
               </a:ext>
             </a:extLst>
           </p:cNvPr>
@@ -6242,7 +5966,7 @@
           <a:p>
             <a:r>
               <a:rPr lang="en-US" dirty="0"/>
-              <a:t>Practical</a:t>
+              <a:t>Software management</a:t>
             </a:r>
           </a:p>
         </p:txBody>
@@ -6252,7 +5976,7 @@
           <p:cNvPr id="3" name="Tijdelijke aanduiding voor inhoud 2">
             <a:extLst>
               <a:ext uri="{FF2B5EF4-FFF2-40B4-BE49-F238E27FC236}">
-                <a16:creationId xmlns:a16="http://schemas.microsoft.com/office/drawing/2014/main" id="{50A491D1-4251-4F79-91DD-BE7F6F7E1CD0}"/>
+                <a16:creationId xmlns:a16="http://schemas.microsoft.com/office/drawing/2014/main" id="{18C82309-55FF-465C-B13F-9C4465D937AE}"/>
               </a:ext>
             </a:extLst>
           </p:cNvPr>
@@ -6263,36 +5987,46 @@
             <p:ph idx="1"/>
           </p:nvPr>
         </p:nvSpPr>
-        <p:spPr>
-          <a:xfrm>
-            <a:off x="818711" y="2222287"/>
-            <a:ext cx="10924797" cy="3636511"/>
-          </a:xfrm>
-        </p:spPr>
+        <p:spPr/>
         <p:txBody>
           <a:bodyPr/>
           <a:lstStyle/>
           <a:p>
             <a:r>
-              <a:rPr lang="en-GB" dirty="0">
-                <a:hlinkClick r:id="rId2"/>
-              </a:rPr>
-              <a:t>https://sils-pub.science.uva.nl/mad/education/BBDA/bioinformatics/SnakemakeTutStart.html</a:t>
-            </a:r>
-            <a:endParaRPr lang="en-GB" dirty="0"/>
-          </a:p>
-          <a:p>
-            <a:pPr marL="0" indent="0">
-              <a:buNone/>
-            </a:pPr>
-            <a:endParaRPr lang="en-US" dirty="0"/>
+              <a:rPr lang="en-US" dirty="0"/>
+              <a:t>Downloading and compiling code </a:t>
+            </a:r>
+          </a:p>
+          <a:p>
+            <a:r>
+              <a:rPr lang="en-US" dirty="0"/>
+              <a:t>Running virtual machine images</a:t>
+            </a:r>
+          </a:p>
+          <a:p>
+            <a:pPr lvl="1"/>
+            <a:r>
+              <a:rPr lang="en-US" dirty="0"/>
+              <a:t> General: Docker</a:t>
+            </a:r>
+          </a:p>
+          <a:p>
+            <a:pPr lvl="1"/>
+            <a:r>
+              <a:rPr lang="en-US" dirty="0" err="1"/>
+              <a:t>Crunchomics</a:t>
+            </a:r>
+            <a:r>
+              <a:rPr lang="en-US" dirty="0"/>
+              <a:t>: Singularity</a:t>
+            </a:r>
           </a:p>
         </p:txBody>
       </p:sp>
     </p:spTree>
     <p:extLst>
       <p:ext uri="{BB962C8B-B14F-4D97-AF65-F5344CB8AC3E}">
-        <p14:creationId xmlns:p14="http://schemas.microsoft.com/office/powerpoint/2010/main" val="2939930269"/>
+        <p14:creationId xmlns:p14="http://schemas.microsoft.com/office/powerpoint/2010/main" val="634612420"/>
       </p:ext>
     </p:extLst>
   </p:cSld>
@@ -6324,7 +6058,7 @@
           <p:cNvPr id="2" name="Titel 1">
             <a:extLst>
               <a:ext uri="{FF2B5EF4-FFF2-40B4-BE49-F238E27FC236}">
-                <a16:creationId xmlns:a16="http://schemas.microsoft.com/office/drawing/2014/main" id="{50A05844-E71A-4CF2-B08C-F880B192BD8C}"/>
+                <a16:creationId xmlns:a16="http://schemas.microsoft.com/office/drawing/2014/main" id="{6074FF8D-2BFA-42B5-9C8A-2A575A7A9E70}"/>
               </a:ext>
             </a:extLst>
           </p:cNvPr>
@@ -6341,10 +6075,9 @@
           <a:lstStyle/>
           <a:p>
             <a:r>
-              <a:rPr lang="en-US" dirty="0" err="1"/>
-              <a:t>Slurm</a:t>
-            </a:r>
-            <a:endParaRPr lang="en-US" dirty="0"/>
+              <a:rPr lang="en-US" dirty="0"/>
+              <a:t>Development and distribution: Git(hub) </a:t>
+            </a:r>
           </a:p>
         </p:txBody>
       </p:sp>
@@ -6353,7 +6086,7 @@
           <p:cNvPr id="3" name="Tijdelijke aanduiding voor inhoud 2">
             <a:extLst>
               <a:ext uri="{FF2B5EF4-FFF2-40B4-BE49-F238E27FC236}">
-                <a16:creationId xmlns:a16="http://schemas.microsoft.com/office/drawing/2014/main" id="{6E9C2FD0-59A3-4F43-B746-CD4609282E5C}"/>
+                <a16:creationId xmlns:a16="http://schemas.microsoft.com/office/drawing/2014/main" id="{28BC0A37-151B-4643-9D93-195A25B73B97}"/>
               </a:ext>
             </a:extLst>
           </p:cNvPr>
@@ -6371,39 +6104,47 @@
           <a:p>
             <a:r>
               <a:rPr lang="en-US" dirty="0"/>
-              <a:t>Need for managing shared computing resources</a:t>
+              <a:t>During analysis: incremental code development</a:t>
             </a:r>
           </a:p>
           <a:p>
             <a:r>
               <a:rPr lang="en-US" dirty="0"/>
-              <a:t>Functions of </a:t>
+              <a:t>Tracking changes</a:t>
+            </a:r>
+          </a:p>
+          <a:p>
+            <a:pPr lvl="1"/>
+            <a:r>
+              <a:rPr lang="en-US" dirty="0"/>
+              <a:t>Restore from older revision if change does not work</a:t>
+            </a:r>
+          </a:p>
+          <a:p>
+            <a:pPr lvl="1"/>
+            <a:r>
+              <a:rPr lang="en-US" dirty="0"/>
+              <a:t>Develop and run code  concurrently </a:t>
+            </a:r>
+          </a:p>
+          <a:p>
+            <a:r>
+              <a:rPr lang="en-US" dirty="0"/>
+              <a:t>Cooperative development team working on code</a:t>
+            </a:r>
+          </a:p>
+          <a:p>
+            <a:r>
+              <a:rPr lang="en-US" dirty="0"/>
+              <a:t>Code distribution:  getting stuff from (or to) </a:t>
             </a:r>
             <a:r>
               <a:rPr lang="en-US" dirty="0" err="1"/>
-              <a:t>Slurm</a:t>
-            </a:r>
-            <a:endParaRPr lang="en-US" dirty="0"/>
-          </a:p>
-          <a:p>
-            <a:pPr lvl="1"/>
-            <a:r>
-              <a:rPr lang="en-GB" dirty="0"/>
-              <a:t>Maintain a queue of work</a:t>
-            </a:r>
-          </a:p>
-          <a:p>
-            <a:pPr lvl="1"/>
-            <a:r>
-              <a:rPr lang="en-GB" dirty="0"/>
-              <a:t>Allocation of resources to users</a:t>
-            </a:r>
-          </a:p>
-          <a:p>
-            <a:pPr lvl="1"/>
-            <a:r>
-              <a:rPr lang="en-GB" dirty="0"/>
-              <a:t>Execute and monitor work (jobs) on the resources</a:t>
+              <a:t>Github</a:t>
+            </a:r>
+            <a:r>
+              <a:rPr lang="en-US" dirty="0"/>
+              <a:t>.    </a:t>
             </a:r>
           </a:p>
         </p:txBody>
@@ -6411,7 +6152,7 @@
     </p:spTree>
     <p:extLst>
       <p:ext uri="{BB962C8B-B14F-4D97-AF65-F5344CB8AC3E}">
-        <p14:creationId xmlns:p14="http://schemas.microsoft.com/office/powerpoint/2010/main" val="2702811381"/>
+        <p14:creationId xmlns:p14="http://schemas.microsoft.com/office/powerpoint/2010/main" val="1574802423"/>
       </p:ext>
     </p:extLst>
   </p:cSld>
@@ -6443,7 +6184,7 @@
           <p:cNvPr id="2" name="Titel 1">
             <a:extLst>
               <a:ext uri="{FF2B5EF4-FFF2-40B4-BE49-F238E27FC236}">
-                <a16:creationId xmlns:a16="http://schemas.microsoft.com/office/drawing/2014/main" id="{5754108E-83A2-481F-AF78-92FF38DC4044}"/>
+                <a16:creationId xmlns:a16="http://schemas.microsoft.com/office/drawing/2014/main" id="{9C7DB70D-9CE3-4D62-837F-2DB44020DDFA}"/>
               </a:ext>
             </a:extLst>
           </p:cNvPr>
@@ -6461,7 +6202,7 @@
           <a:p>
             <a:r>
               <a:rPr lang="en-US" dirty="0"/>
-              <a:t>Nodes, sockets, cores and threads</a:t>
+              <a:t>Practical</a:t>
             </a:r>
           </a:p>
         </p:txBody>
@@ -6471,7 +6212,7 @@
           <p:cNvPr id="3" name="Tijdelijke aanduiding voor inhoud 2">
             <a:extLst>
               <a:ext uri="{FF2B5EF4-FFF2-40B4-BE49-F238E27FC236}">
-                <a16:creationId xmlns:a16="http://schemas.microsoft.com/office/drawing/2014/main" id="{93A366F2-B821-4080-A2A6-0D710B056F14}"/>
+                <a16:creationId xmlns:a16="http://schemas.microsoft.com/office/drawing/2014/main" id="{50A491D1-4251-4F79-91DD-BE7F6F7E1CD0}"/>
               </a:ext>
             </a:extLst>
           </p:cNvPr>
@@ -6484,8 +6225,8 @@
         </p:nvSpPr>
         <p:spPr>
           <a:xfrm>
-            <a:off x="818712" y="2222287"/>
-            <a:ext cx="6156854" cy="4188525"/>
+            <a:off x="818711" y="2222287"/>
+            <a:ext cx="10924797" cy="3636511"/>
           </a:xfrm>
         </p:spPr>
         <p:txBody>
@@ -6493,284 +6234,25 @@
           <a:lstStyle/>
           <a:p>
             <a:r>
-              <a:rPr lang="en-US" dirty="0"/>
-              <a:t>Nodes  &lt; sockets &lt; cores &lt; threads</a:t>
-            </a:r>
-          </a:p>
-          <a:p>
-            <a:r>
-              <a:rPr lang="en-US" dirty="0"/>
-              <a:t> Example </a:t>
-            </a:r>
-            <a:r>
-              <a:rPr lang="en-US" dirty="0" err="1"/>
-              <a:t>Crunchomics</a:t>
-            </a:r>
-            <a:r>
-              <a:rPr lang="en-US" dirty="0"/>
-              <a:t>:</a:t>
-            </a:r>
-          </a:p>
-          <a:p>
-            <a:pPr lvl="1"/>
-            <a:r>
-              <a:rPr lang="en-US" dirty="0"/>
-              <a:t>5 systems, each 2 sockets each 16 cores each 2 threads:  total  320 threads </a:t>
-            </a:r>
-          </a:p>
-          <a:p>
-            <a:pPr lvl="1"/>
-            <a:r>
-              <a:rPr lang="en-US" dirty="0"/>
-              <a:t>CPU: typically used for core</a:t>
-            </a:r>
-          </a:p>
-          <a:p>
-            <a:pPr lvl="1"/>
-            <a:r>
-              <a:rPr lang="en-US" dirty="0" err="1"/>
-              <a:t>Slurm@omics</a:t>
-            </a:r>
-            <a:r>
-              <a:rPr lang="en-US" dirty="0"/>
-              <a:t>:  </a:t>
-            </a:r>
-            <a:r>
-              <a:rPr lang="en-US" dirty="0" err="1"/>
-              <a:t>cpu</a:t>
-            </a:r>
-            <a:r>
-              <a:rPr lang="en-US" dirty="0"/>
-              <a:t> = core or thread   </a:t>
-            </a:r>
-          </a:p>
-          <a:p>
-            <a:r>
-              <a:rPr lang="en-US" dirty="0"/>
-              <a:t>Thread is not hardware: single core swapping between two instruction sequences as cores are mostly idle waiting for data</a:t>
-            </a:r>
-          </a:p>
-        </p:txBody>
-      </p:sp>
-      <p:pic>
-        <p:nvPicPr>
-          <p:cNvPr id="1026" name="Picture 2" descr="CPU Vs Core Vs Socket - Here is What You Know">
-            <a:extLst>
-              <a:ext uri="{FF2B5EF4-FFF2-40B4-BE49-F238E27FC236}">
-                <a16:creationId xmlns:a16="http://schemas.microsoft.com/office/drawing/2014/main" id="{F92DCD85-D2C5-47DC-B37E-F70D3B181628}"/>
-              </a:ext>
-            </a:extLst>
-          </p:cNvPr>
-          <p:cNvPicPr>
-            <a:picLocks noChangeAspect="1" noChangeArrowheads="1"/>
-          </p:cNvPicPr>
-          <p:nvPr/>
-        </p:nvPicPr>
-        <p:blipFill>
-          <a:blip r:embed="rId2">
-            <a:extLst>
-              <a:ext uri="{28A0092B-C50C-407E-A947-70E740481C1C}">
-                <a14:useLocalDpi xmlns:a14="http://schemas.microsoft.com/office/drawing/2010/main" val="0"/>
-              </a:ext>
-            </a:extLst>
-          </a:blip>
-          <a:srcRect/>
-          <a:stretch>
-            <a:fillRect/>
-          </a:stretch>
-        </p:blipFill>
-        <p:spPr bwMode="auto">
-          <a:xfrm>
-            <a:off x="7115788" y="3657599"/>
-            <a:ext cx="5205748" cy="2979721"/>
-          </a:xfrm>
-          <a:prstGeom prst="rect">
-            <a:avLst/>
-          </a:prstGeom>
-          <a:noFill/>
-          <a:extLst>
-            <a:ext uri="{909E8E84-426E-40DD-AFC4-6F175D3DCCD1}">
-              <a14:hiddenFill xmlns:a14="http://schemas.microsoft.com/office/drawing/2010/main">
-                <a:solidFill>
-                  <a:srgbClr val="FFFFFF"/>
-                </a:solidFill>
-              </a14:hiddenFill>
-            </a:ext>
-          </a:extLst>
-        </p:spPr>
-      </p:pic>
-      <p:pic>
-        <p:nvPicPr>
-          <p:cNvPr id="4" name="Afbeelding 3">
-            <a:extLst>
-              <a:ext uri="{FF2B5EF4-FFF2-40B4-BE49-F238E27FC236}">
-                <a16:creationId xmlns:a16="http://schemas.microsoft.com/office/drawing/2014/main" id="{92020665-BBF5-4B63-99C1-F63E311713E2}"/>
-              </a:ext>
-            </a:extLst>
-          </p:cNvPr>
-          <p:cNvPicPr>
-            <a:picLocks noChangeAspect="1"/>
-          </p:cNvPicPr>
-          <p:nvPr/>
-        </p:nvPicPr>
-        <p:blipFill>
-          <a:blip r:embed="rId3"/>
-          <a:stretch>
-            <a:fillRect/>
-          </a:stretch>
-        </p:blipFill>
-        <p:spPr>
-          <a:xfrm>
-            <a:off x="8820694" y="1675583"/>
-            <a:ext cx="3276600" cy="1390650"/>
-          </a:xfrm>
-          <a:prstGeom prst="rect">
-            <a:avLst/>
-          </a:prstGeom>
-        </p:spPr>
-      </p:pic>
+              <a:rPr lang="en-GB" dirty="0">
+                <a:hlinkClick r:id="rId2"/>
+              </a:rPr>
+              <a:t>https://sils-pub.science.uva.nl/mad/education/BBDA/bioinformatics/develop.html</a:t>
+            </a:r>
+            <a:endParaRPr lang="en-GB" dirty="0"/>
+          </a:p>
+          <a:p>
+            <a:pPr marL="0" indent="0">
+              <a:buNone/>
+            </a:pPr>
+            <a:endParaRPr lang="en-US" dirty="0"/>
+          </a:p>
+        </p:txBody>
+      </p:sp>
     </p:spTree>
     <p:extLst>
       <p:ext uri="{BB962C8B-B14F-4D97-AF65-F5344CB8AC3E}">
-        <p14:creationId xmlns:p14="http://schemas.microsoft.com/office/powerpoint/2010/main" val="933469828"/>
-      </p:ext>
-    </p:extLst>
-  </p:cSld>
-  <p:clrMapOvr>
-    <a:masterClrMapping/>
-  </p:clrMapOvr>
-</p:sld>
-</file>
-
-<file path=ppt/slides/slide9.xml><?xml version="1.0" encoding="utf-8"?>
-<p:sld xmlns:a="http://schemas.openxmlformats.org/drawingml/2006/main" xmlns:r="http://schemas.openxmlformats.org/officeDocument/2006/relationships" xmlns:p="http://schemas.openxmlformats.org/presentationml/2006/main">
-  <p:cSld>
-    <p:spTree>
-      <p:nvGrpSpPr>
-        <p:cNvPr id="1" name=""/>
-        <p:cNvGrpSpPr/>
-        <p:nvPr/>
-      </p:nvGrpSpPr>
-      <p:grpSpPr>
-        <a:xfrm>
-          <a:off x="0" y="0"/>
-          <a:ext cx="0" cy="0"/>
-          <a:chOff x="0" y="0"/>
-          <a:chExt cx="0" cy="0"/>
-        </a:xfrm>
-      </p:grpSpPr>
-      <p:sp>
-        <p:nvSpPr>
-          <p:cNvPr id="2" name="Titel 1">
-            <a:extLst>
-              <a:ext uri="{FF2B5EF4-FFF2-40B4-BE49-F238E27FC236}">
-                <a16:creationId xmlns:a16="http://schemas.microsoft.com/office/drawing/2014/main" id="{BB8FB7BA-7F94-46C3-8344-A4A4711845F5}"/>
-              </a:ext>
-            </a:extLst>
-          </p:cNvPr>
-          <p:cNvSpPr>
-            <a:spLocks noGrp="1"/>
-          </p:cNvSpPr>
-          <p:nvPr>
-            <p:ph type="title"/>
-          </p:nvPr>
-        </p:nvSpPr>
-        <p:spPr/>
-        <p:txBody>
-          <a:bodyPr/>
-          <a:lstStyle/>
-          <a:p>
-            <a:r>
-              <a:rPr lang="en-US" dirty="0"/>
-              <a:t>Multi threading </a:t>
-            </a:r>
-          </a:p>
-        </p:txBody>
-      </p:sp>
-      <p:sp>
-        <p:nvSpPr>
-          <p:cNvPr id="3" name="Tijdelijke aanduiding voor inhoud 2">
-            <a:extLst>
-              <a:ext uri="{FF2B5EF4-FFF2-40B4-BE49-F238E27FC236}">
-                <a16:creationId xmlns:a16="http://schemas.microsoft.com/office/drawing/2014/main" id="{4CB906F0-759A-4EED-8972-845B48EF5317}"/>
-              </a:ext>
-            </a:extLst>
-          </p:cNvPr>
-          <p:cNvSpPr>
-            <a:spLocks noGrp="1"/>
-          </p:cNvSpPr>
-          <p:nvPr>
-            <p:ph idx="1"/>
-          </p:nvPr>
-        </p:nvSpPr>
-        <p:spPr/>
-        <p:txBody>
-          <a:bodyPr/>
-          <a:lstStyle/>
-          <a:p>
-            <a:r>
-              <a:rPr lang="en-US" dirty="0"/>
-              <a:t>A simple program is a single sequence of instruction: single thread</a:t>
-            </a:r>
-          </a:p>
-          <a:p>
-            <a:r>
-              <a:rPr lang="en-US" dirty="0"/>
-              <a:t>Programs can start other programs/threads. </a:t>
-            </a:r>
-          </a:p>
-          <a:p>
-            <a:r>
-              <a:rPr lang="en-US" dirty="0"/>
-              <a:t>Communication needed between threads </a:t>
-            </a:r>
-          </a:p>
-          <a:p>
-            <a:pPr lvl="1"/>
-            <a:r>
-              <a:rPr lang="en-US" dirty="0"/>
-              <a:t>On a single system multithreading relatively easy</a:t>
-            </a:r>
-          </a:p>
-          <a:p>
-            <a:pPr lvl="1"/>
-            <a:r>
-              <a:rPr lang="en-US" dirty="0"/>
-              <a:t>Between systems via network  (e.g. MPI)   more difficult and less common </a:t>
-            </a:r>
-          </a:p>
-          <a:p>
-            <a:r>
-              <a:rPr lang="en-US" dirty="0"/>
-              <a:t>Communication and synchronization between threads consumes extra time</a:t>
-            </a:r>
-          </a:p>
-          <a:p>
-            <a:pPr lvl="1"/>
-            <a:r>
-              <a:rPr lang="en-US" dirty="0"/>
-              <a:t>Scaling not linear,  adding threads might will not proportionally improve running time </a:t>
-            </a:r>
-          </a:p>
-          <a:p>
-            <a:pPr lvl="1"/>
-            <a:r>
-              <a:rPr lang="en-US" dirty="0"/>
-              <a:t>Large variation inn scaling properties check scaling properties if in doubt. </a:t>
-            </a:r>
-          </a:p>
-          <a:p>
-            <a:r>
-              <a:rPr lang="en-US" dirty="0"/>
-              <a:t>Mapping usually good scaling,  trimming few threads max.  </a:t>
-            </a:r>
-          </a:p>
-        </p:txBody>
-      </p:sp>
-    </p:spTree>
-    <p:extLst>
-      <p:ext uri="{BB962C8B-B14F-4D97-AF65-F5344CB8AC3E}">
-        <p14:creationId xmlns:p14="http://schemas.microsoft.com/office/powerpoint/2010/main" val="2222481846"/>
+        <p14:creationId xmlns:p14="http://schemas.microsoft.com/office/powerpoint/2010/main" val="2939930269"/>
       </p:ext>
     </p:extLst>
   </p:cSld>

</xml_diff>